<commit_message>
Saved block diagram pptx
</commit_message>
<xml_diff>
--- a/HootBeat-block_diagram.pptx
+++ b/HootBeat-block_diagram.pptx
@@ -6488,16 +6488,10 @@
           <a:p>
             <a:pPr algn="ctr"/>
             <a:r>
-              <a:rPr lang="en-US" sz="2000" dirty="0" err="1">
-                <a:latin typeface="Abadi" panose="020B0604020104020204" pitchFamily="34" charset="0"/>
-              </a:rPr>
-              <a:t>HootBeat</a:t>
-            </a:r>
-            <a:r>
               <a:rPr lang="en-US" sz="2000" dirty="0">
                 <a:latin typeface="Abadi" panose="020B0604020104020204" pitchFamily="34" charset="0"/>
               </a:rPr>
-              <a:t> brain</a:t>
+              <a:t>HootBeat brain</a:t>
             </a:r>
           </a:p>
           <a:p>
@@ -6579,14 +6573,11 @@
           <a:p>
             <a:pPr algn="ctr"/>
             <a:r>
-              <a:rPr lang="en-US" sz="2000" dirty="0" err="1">
+              <a:rPr lang="en-US" sz="2000" dirty="0">
                 <a:latin typeface="Abadi" panose="020B0604020104020204" pitchFamily="34" charset="0"/>
               </a:rPr>
               <a:t>HootBeat</a:t>
             </a:r>
-            <a:endParaRPr lang="en-US" sz="2000" dirty="0">
-              <a:latin typeface="Abadi" panose="020B0604020104020204" pitchFamily="34" charset="0"/>
-            </a:endParaRPr>
           </a:p>
           <a:p>
             <a:pPr algn="ctr"/>
@@ -6796,14 +6787,11 @@
           <a:lstStyle/>
           <a:p>
             <a:r>
-              <a:rPr lang="en-US" sz="2000">
+              <a:rPr lang="en-US" sz="2000" dirty="0">
                 <a:latin typeface="Abadi" panose="020B0604020104020204" pitchFamily="34" charset="0"/>
               </a:rPr>
               <a:t>USB-MIDI</a:t>
             </a:r>
-            <a:endParaRPr lang="en-US" sz="2000" dirty="0">
-              <a:latin typeface="Abadi" panose="020B0604020104020204" pitchFamily="34" charset="0"/>
-            </a:endParaRPr>
           </a:p>
           <a:p>
             <a:r>
@@ -6978,14 +6966,11 @@
           <a:p>
             <a:pPr algn="ctr"/>
             <a:r>
-              <a:rPr lang="en-US" sz="5400" dirty="0" err="1">
+              <a:rPr lang="en-US" sz="5400" dirty="0">
                 <a:latin typeface="Abadi" panose="020B0604020104020204" pitchFamily="34" charset="0"/>
               </a:rPr>
               <a:t>oo</a:t>
             </a:r>
-            <a:endParaRPr lang="en-US" sz="5400" dirty="0">
-              <a:latin typeface="Abadi" panose="020B0604020104020204" pitchFamily="34" charset="0"/>
-            </a:endParaRPr>
           </a:p>
         </p:txBody>
       </p:sp>

</xml_diff>

<commit_message>
Minor change to block diagram
</commit_message>
<xml_diff>
--- a/HootBeat-block_diagram.pptx
+++ b/HootBeat-block_diagram.pptx
@@ -3380,10 +3380,10 @@
       </p:sp>
       <p:grpSp>
         <p:nvGrpSpPr>
-          <p:cNvPr id="8" name="Group 7">
-            <a:extLst>
-              <a:ext uri="{FF2B5EF4-FFF2-40B4-BE49-F238E27FC236}">
-                <a16:creationId xmlns:a16="http://schemas.microsoft.com/office/drawing/2014/main" id="{32D0FEF8-BBB4-47F8-87E0-A741185D409A}"/>
+          <p:cNvPr id="5" name="Group 4">
+            <a:extLst>
+              <a:ext uri="{FF2B5EF4-FFF2-40B4-BE49-F238E27FC236}">
+                <a16:creationId xmlns:a16="http://schemas.microsoft.com/office/drawing/2014/main" id="{8F1B06BF-4BDA-4DAD-9A27-D3A6BD1FB8A9}"/>
               </a:ext>
             </a:extLst>
           </p:cNvPr>
@@ -3392,18 +3392,18 @@
         </p:nvGrpSpPr>
         <p:grpSpPr>
           <a:xfrm>
-            <a:off x="8670650" y="573836"/>
-            <a:ext cx="1007043" cy="471754"/>
-            <a:chOff x="2161567" y="1050705"/>
-            <a:chExt cx="1928651" cy="903486"/>
+            <a:off x="8588360" y="634978"/>
+            <a:ext cx="1238949" cy="447746"/>
+            <a:chOff x="8707899" y="597844"/>
+            <a:chExt cx="1238949" cy="447746"/>
           </a:xfrm>
         </p:grpSpPr>
         <p:sp>
           <p:nvSpPr>
-            <p:cNvPr id="7" name="Block Arc 6">
+            <p:cNvPr id="3" name="Arrow: Curved Right 2">
               <a:extLst>
                 <a:ext uri="{FF2B5EF4-FFF2-40B4-BE49-F238E27FC236}">
-                  <a16:creationId xmlns:a16="http://schemas.microsoft.com/office/drawing/2014/main" id="{2DBD3BF4-9B99-44D6-83D5-302F48268DE4}"/>
+                  <a16:creationId xmlns:a16="http://schemas.microsoft.com/office/drawing/2014/main" id="{38894D8D-97AB-4A26-8B5C-325D49EF5A7B}"/>
                 </a:ext>
               </a:extLst>
             </p:cNvPr>
@@ -3411,18 +3411,17 @@
             <p:nvPr/>
           </p:nvSpPr>
           <p:spPr>
-            <a:xfrm rot="5174612">
-              <a:off x="2927028" y="523249"/>
-              <a:ext cx="635734" cy="1690646"/>
+            <a:xfrm rot="20865349" flipH="1">
+              <a:off x="8945041" y="597844"/>
+              <a:ext cx="1001807" cy="313286"/>
             </a:xfrm>
-            <a:prstGeom prst="blockArc">
+            <a:prstGeom prst="curvedRightArrow">
               <a:avLst>
-                <a:gd name="adj1" fmla="val 4480086"/>
-                <a:gd name="adj2" fmla="val 1257505"/>
-                <a:gd name="adj3" fmla="val 18580"/>
+                <a:gd name="adj1" fmla="val 40132"/>
+                <a:gd name="adj2" fmla="val 27281"/>
+                <a:gd name="adj3" fmla="val 47456"/>
               </a:avLst>
             </a:prstGeom>
-            <a:ln w="28575"/>
           </p:spPr>
           <p:style>
             <a:lnRef idx="2">
@@ -3467,8 +3466,8 @@
           </p:nvSpPr>
           <p:spPr>
             <a:xfrm rot="15605945">
-              <a:off x="2078855" y="1274903"/>
-              <a:ext cx="713509" cy="548085"/>
+              <a:off x="8669166" y="703560"/>
+              <a:ext cx="334126" cy="256660"/>
             </a:xfrm>
             <a:prstGeom prst="can">
               <a:avLst>
@@ -3516,356 +3515,8 @@
           </p:nvSpPr>
           <p:spPr>
             <a:xfrm rot="15605945">
-              <a:off x="2556837" y="1323394"/>
-              <a:ext cx="713509" cy="548085"/>
-            </a:xfrm>
-            <a:prstGeom prst="can">
-              <a:avLst>
-                <a:gd name="adj" fmla="val 50000"/>
-              </a:avLst>
-            </a:prstGeom>
-            <a:ln w="28575"/>
-          </p:spPr>
-          <p:style>
-            <a:lnRef idx="2">
-              <a:schemeClr val="dk1">
-                <a:shade val="50000"/>
-              </a:schemeClr>
-            </a:lnRef>
-            <a:fillRef idx="1">
-              <a:schemeClr val="dk1"/>
-            </a:fillRef>
-            <a:effectRef idx="0">
-              <a:schemeClr val="dk1"/>
-            </a:effectRef>
-            <a:fontRef idx="minor">
-              <a:schemeClr val="lt1"/>
-            </a:fontRef>
-          </p:style>
-          <p:txBody>
-            <a:bodyPr rtlCol="0" anchor="ctr"/>
-            <a:lstStyle/>
-            <a:p>
-              <a:pPr algn="ctr"/>
-              <a:endParaRPr lang="en-US"/>
-            </a:p>
-          </p:txBody>
-        </p:sp>
-      </p:grpSp>
-      <p:grpSp>
-        <p:nvGrpSpPr>
-          <p:cNvPr id="9" name="Group 8">
-            <a:extLst>
-              <a:ext uri="{FF2B5EF4-FFF2-40B4-BE49-F238E27FC236}">
-                <a16:creationId xmlns:a16="http://schemas.microsoft.com/office/drawing/2014/main" id="{9F90C249-CF2F-427A-81F7-DD7412EEA2B1}"/>
-              </a:ext>
-            </a:extLst>
-          </p:cNvPr>
-          <p:cNvGrpSpPr/>
-          <p:nvPr/>
-        </p:nvGrpSpPr>
-        <p:grpSpPr>
-          <a:xfrm>
-            <a:off x="9582055" y="2050594"/>
-            <a:ext cx="1007043" cy="471754"/>
-            <a:chOff x="2161567" y="1050705"/>
-            <a:chExt cx="1928651" cy="903486"/>
-          </a:xfrm>
-        </p:grpSpPr>
-        <p:sp>
-          <p:nvSpPr>
-            <p:cNvPr id="10" name="Block Arc 9">
-              <a:extLst>
-                <a:ext uri="{FF2B5EF4-FFF2-40B4-BE49-F238E27FC236}">
-                  <a16:creationId xmlns:a16="http://schemas.microsoft.com/office/drawing/2014/main" id="{7CB9D565-D3FF-4AF5-81A6-8323D9C43A1C}"/>
-                </a:ext>
-              </a:extLst>
-            </p:cNvPr>
-            <p:cNvSpPr/>
-            <p:nvPr/>
-          </p:nvSpPr>
-          <p:spPr>
-            <a:xfrm rot="5174612">
-              <a:off x="2927028" y="523249"/>
-              <a:ext cx="635734" cy="1690646"/>
-            </a:xfrm>
-            <a:prstGeom prst="blockArc">
-              <a:avLst>
-                <a:gd name="adj1" fmla="val 4480086"/>
-                <a:gd name="adj2" fmla="val 1257505"/>
-                <a:gd name="adj3" fmla="val 18580"/>
-              </a:avLst>
-            </a:prstGeom>
-            <a:ln w="28575"/>
-          </p:spPr>
-          <p:style>
-            <a:lnRef idx="2">
-              <a:schemeClr val="dk1">
-                <a:shade val="50000"/>
-              </a:schemeClr>
-            </a:lnRef>
-            <a:fillRef idx="1">
-              <a:schemeClr val="dk1"/>
-            </a:fillRef>
-            <a:effectRef idx="0">
-              <a:schemeClr val="dk1"/>
-            </a:effectRef>
-            <a:fontRef idx="minor">
-              <a:schemeClr val="lt1"/>
-            </a:fontRef>
-          </p:style>
-          <p:txBody>
-            <a:bodyPr rtlCol="0" anchor="ctr"/>
-            <a:lstStyle/>
-            <a:p>
-              <a:pPr algn="ctr"/>
-              <a:endParaRPr lang="en-US">
-                <a:solidFill>
-                  <a:schemeClr val="tx1"/>
-                </a:solidFill>
-              </a:endParaRPr>
-            </a:p>
-          </p:txBody>
-        </p:sp>
-        <p:sp>
-          <p:nvSpPr>
-            <p:cNvPr id="11" name="Cylinder 10">
-              <a:extLst>
-                <a:ext uri="{FF2B5EF4-FFF2-40B4-BE49-F238E27FC236}">
-                  <a16:creationId xmlns:a16="http://schemas.microsoft.com/office/drawing/2014/main" id="{D81C439D-089F-4C95-A97C-18DD2F919BFB}"/>
-                </a:ext>
-              </a:extLst>
-            </p:cNvPr>
-            <p:cNvSpPr/>
-            <p:nvPr/>
-          </p:nvSpPr>
-          <p:spPr>
-            <a:xfrm rot="15605945">
-              <a:off x="2078855" y="1274903"/>
-              <a:ext cx="713509" cy="548085"/>
-            </a:xfrm>
-            <a:prstGeom prst="can">
-              <a:avLst>
-                <a:gd name="adj" fmla="val 50000"/>
-              </a:avLst>
-            </a:prstGeom>
-            <a:ln w="28575"/>
-          </p:spPr>
-          <p:style>
-            <a:lnRef idx="2">
-              <a:schemeClr val="dk1">
-                <a:shade val="50000"/>
-              </a:schemeClr>
-            </a:lnRef>
-            <a:fillRef idx="1">
-              <a:schemeClr val="dk1"/>
-            </a:fillRef>
-            <a:effectRef idx="0">
-              <a:schemeClr val="dk1"/>
-            </a:effectRef>
-            <a:fontRef idx="minor">
-              <a:schemeClr val="lt1"/>
-            </a:fontRef>
-          </p:style>
-          <p:txBody>
-            <a:bodyPr rtlCol="0" anchor="ctr"/>
-            <a:lstStyle/>
-            <a:p>
-              <a:pPr algn="ctr"/>
-              <a:endParaRPr lang="en-US"/>
-            </a:p>
-          </p:txBody>
-        </p:sp>
-        <p:sp>
-          <p:nvSpPr>
-            <p:cNvPr id="12" name="Cylinder 11">
-              <a:extLst>
-                <a:ext uri="{FF2B5EF4-FFF2-40B4-BE49-F238E27FC236}">
-                  <a16:creationId xmlns:a16="http://schemas.microsoft.com/office/drawing/2014/main" id="{FDCF9699-88FE-457F-93DA-B09518C1AAF9}"/>
-                </a:ext>
-              </a:extLst>
-            </p:cNvPr>
-            <p:cNvSpPr/>
-            <p:nvPr/>
-          </p:nvSpPr>
-          <p:spPr>
-            <a:xfrm rot="15605945">
-              <a:off x="2556837" y="1323394"/>
-              <a:ext cx="713509" cy="548085"/>
-            </a:xfrm>
-            <a:prstGeom prst="can">
-              <a:avLst>
-                <a:gd name="adj" fmla="val 50000"/>
-              </a:avLst>
-            </a:prstGeom>
-            <a:ln w="28575"/>
-          </p:spPr>
-          <p:style>
-            <a:lnRef idx="2">
-              <a:schemeClr val="dk1">
-                <a:shade val="50000"/>
-              </a:schemeClr>
-            </a:lnRef>
-            <a:fillRef idx="1">
-              <a:schemeClr val="dk1"/>
-            </a:fillRef>
-            <a:effectRef idx="0">
-              <a:schemeClr val="dk1"/>
-            </a:effectRef>
-            <a:fontRef idx="minor">
-              <a:schemeClr val="lt1"/>
-            </a:fontRef>
-          </p:style>
-          <p:txBody>
-            <a:bodyPr rtlCol="0" anchor="ctr"/>
-            <a:lstStyle/>
-            <a:p>
-              <a:pPr algn="ctr"/>
-              <a:endParaRPr lang="en-US"/>
-            </a:p>
-          </p:txBody>
-        </p:sp>
-      </p:grpSp>
-      <p:grpSp>
-        <p:nvGrpSpPr>
-          <p:cNvPr id="13" name="Group 12">
-            <a:extLst>
-              <a:ext uri="{FF2B5EF4-FFF2-40B4-BE49-F238E27FC236}">
-                <a16:creationId xmlns:a16="http://schemas.microsoft.com/office/drawing/2014/main" id="{2AABCB87-0C7D-44E5-9F6A-D75FBD525713}"/>
-              </a:ext>
-            </a:extLst>
-          </p:cNvPr>
-          <p:cNvGrpSpPr/>
-          <p:nvPr/>
-        </p:nvGrpSpPr>
-        <p:grpSpPr>
-          <a:xfrm>
-            <a:off x="9696403" y="1067420"/>
-            <a:ext cx="1007043" cy="471754"/>
-            <a:chOff x="2161567" y="1050705"/>
-            <a:chExt cx="1928651" cy="903486"/>
-          </a:xfrm>
-        </p:grpSpPr>
-        <p:sp>
-          <p:nvSpPr>
-            <p:cNvPr id="14" name="Block Arc 13">
-              <a:extLst>
-                <a:ext uri="{FF2B5EF4-FFF2-40B4-BE49-F238E27FC236}">
-                  <a16:creationId xmlns:a16="http://schemas.microsoft.com/office/drawing/2014/main" id="{BA91F6EA-311D-48BD-9E7D-35FE326823BF}"/>
-                </a:ext>
-              </a:extLst>
-            </p:cNvPr>
-            <p:cNvSpPr/>
-            <p:nvPr/>
-          </p:nvSpPr>
-          <p:spPr>
-            <a:xfrm rot="5174612">
-              <a:off x="2927028" y="523249"/>
-              <a:ext cx="635734" cy="1690646"/>
-            </a:xfrm>
-            <a:prstGeom prst="blockArc">
-              <a:avLst>
-                <a:gd name="adj1" fmla="val 4480086"/>
-                <a:gd name="adj2" fmla="val 1257505"/>
-                <a:gd name="adj3" fmla="val 18580"/>
-              </a:avLst>
-            </a:prstGeom>
-            <a:ln w="28575"/>
-          </p:spPr>
-          <p:style>
-            <a:lnRef idx="2">
-              <a:schemeClr val="dk1">
-                <a:shade val="50000"/>
-              </a:schemeClr>
-            </a:lnRef>
-            <a:fillRef idx="1">
-              <a:schemeClr val="dk1"/>
-            </a:fillRef>
-            <a:effectRef idx="0">
-              <a:schemeClr val="dk1"/>
-            </a:effectRef>
-            <a:fontRef idx="minor">
-              <a:schemeClr val="lt1"/>
-            </a:fontRef>
-          </p:style>
-          <p:txBody>
-            <a:bodyPr rtlCol="0" anchor="ctr"/>
-            <a:lstStyle/>
-            <a:p>
-              <a:pPr algn="ctr"/>
-              <a:endParaRPr lang="en-US">
-                <a:solidFill>
-                  <a:schemeClr val="tx1"/>
-                </a:solidFill>
-              </a:endParaRPr>
-            </a:p>
-          </p:txBody>
-        </p:sp>
-        <p:sp>
-          <p:nvSpPr>
-            <p:cNvPr id="15" name="Cylinder 14">
-              <a:extLst>
-                <a:ext uri="{FF2B5EF4-FFF2-40B4-BE49-F238E27FC236}">
-                  <a16:creationId xmlns:a16="http://schemas.microsoft.com/office/drawing/2014/main" id="{28DA6E16-E58F-4BEF-A33B-C2BE0A95DE3D}"/>
-                </a:ext>
-              </a:extLst>
-            </p:cNvPr>
-            <p:cNvSpPr/>
-            <p:nvPr/>
-          </p:nvSpPr>
-          <p:spPr>
-            <a:xfrm rot="15605945">
-              <a:off x="2078855" y="1274903"/>
-              <a:ext cx="713509" cy="548085"/>
-            </a:xfrm>
-            <a:prstGeom prst="can">
-              <a:avLst>
-                <a:gd name="adj" fmla="val 50000"/>
-              </a:avLst>
-            </a:prstGeom>
-            <a:ln w="28575"/>
-          </p:spPr>
-          <p:style>
-            <a:lnRef idx="2">
-              <a:schemeClr val="dk1">
-                <a:shade val="50000"/>
-              </a:schemeClr>
-            </a:lnRef>
-            <a:fillRef idx="1">
-              <a:schemeClr val="dk1"/>
-            </a:fillRef>
-            <a:effectRef idx="0">
-              <a:schemeClr val="dk1"/>
-            </a:effectRef>
-            <a:fontRef idx="minor">
-              <a:schemeClr val="lt1"/>
-            </a:fontRef>
-          </p:style>
-          <p:txBody>
-            <a:bodyPr rtlCol="0" anchor="ctr"/>
-            <a:lstStyle/>
-            <a:p>
-              <a:pPr algn="ctr"/>
-              <a:endParaRPr lang="en-US"/>
-            </a:p>
-          </p:txBody>
-        </p:sp>
-        <p:sp>
-          <p:nvSpPr>
-            <p:cNvPr id="16" name="Cylinder 15">
-              <a:extLst>
-                <a:ext uri="{FF2B5EF4-FFF2-40B4-BE49-F238E27FC236}">
-                  <a16:creationId xmlns:a16="http://schemas.microsoft.com/office/drawing/2014/main" id="{6B379B8E-3E11-4DCB-84C5-C39C5BD0ACC8}"/>
-                </a:ext>
-              </a:extLst>
-            </p:cNvPr>
-            <p:cNvSpPr/>
-            <p:nvPr/>
-          </p:nvSpPr>
-          <p:spPr>
-            <a:xfrm rot="15605945">
-              <a:off x="2556837" y="1323394"/>
-              <a:ext cx="713509" cy="548085"/>
+              <a:off x="8877040" y="716220"/>
+              <a:ext cx="372558" cy="286182"/>
             </a:xfrm>
             <a:prstGeom prst="can">
               <a:avLst>
@@ -6974,6 +6625,352 @@
           </a:p>
         </p:txBody>
       </p:sp>
+      <p:grpSp>
+        <p:nvGrpSpPr>
+          <p:cNvPr id="60" name="Group 59">
+            <a:extLst>
+              <a:ext uri="{FF2B5EF4-FFF2-40B4-BE49-F238E27FC236}">
+                <a16:creationId xmlns:a16="http://schemas.microsoft.com/office/drawing/2014/main" id="{22505D96-7EB4-40A8-B0BF-E755E9DDC90A}"/>
+              </a:ext>
+            </a:extLst>
+          </p:cNvPr>
+          <p:cNvGrpSpPr/>
+          <p:nvPr/>
+        </p:nvGrpSpPr>
+        <p:grpSpPr>
+          <a:xfrm>
+            <a:off x="9519406" y="1190562"/>
+            <a:ext cx="1238949" cy="447746"/>
+            <a:chOff x="8707899" y="597844"/>
+            <a:chExt cx="1238949" cy="447746"/>
+          </a:xfrm>
+        </p:grpSpPr>
+        <p:sp>
+          <p:nvSpPr>
+            <p:cNvPr id="62" name="Arrow: Curved Right 61">
+              <a:extLst>
+                <a:ext uri="{FF2B5EF4-FFF2-40B4-BE49-F238E27FC236}">
+                  <a16:creationId xmlns:a16="http://schemas.microsoft.com/office/drawing/2014/main" id="{B1902250-3267-4621-933C-DCD444802F2D}"/>
+                </a:ext>
+              </a:extLst>
+            </p:cNvPr>
+            <p:cNvSpPr/>
+            <p:nvPr/>
+          </p:nvSpPr>
+          <p:spPr>
+            <a:xfrm rot="20865349" flipH="1">
+              <a:off x="8945041" y="597844"/>
+              <a:ext cx="1001807" cy="313286"/>
+            </a:xfrm>
+            <a:prstGeom prst="curvedRightArrow">
+              <a:avLst>
+                <a:gd name="adj1" fmla="val 40132"/>
+                <a:gd name="adj2" fmla="val 27281"/>
+                <a:gd name="adj3" fmla="val 47456"/>
+              </a:avLst>
+            </a:prstGeom>
+          </p:spPr>
+          <p:style>
+            <a:lnRef idx="2">
+              <a:schemeClr val="dk1">
+                <a:shade val="50000"/>
+              </a:schemeClr>
+            </a:lnRef>
+            <a:fillRef idx="1">
+              <a:schemeClr val="dk1"/>
+            </a:fillRef>
+            <a:effectRef idx="0">
+              <a:schemeClr val="dk1"/>
+            </a:effectRef>
+            <a:fontRef idx="minor">
+              <a:schemeClr val="lt1"/>
+            </a:fontRef>
+          </p:style>
+          <p:txBody>
+            <a:bodyPr rtlCol="0" anchor="ctr"/>
+            <a:lstStyle/>
+            <a:p>
+              <a:pPr algn="ctr"/>
+              <a:endParaRPr lang="en-US">
+                <a:solidFill>
+                  <a:schemeClr val="tx1"/>
+                </a:solidFill>
+              </a:endParaRPr>
+            </a:p>
+          </p:txBody>
+        </p:sp>
+        <p:sp>
+          <p:nvSpPr>
+            <p:cNvPr id="63" name="Cylinder 62">
+              <a:extLst>
+                <a:ext uri="{FF2B5EF4-FFF2-40B4-BE49-F238E27FC236}">
+                  <a16:creationId xmlns:a16="http://schemas.microsoft.com/office/drawing/2014/main" id="{F84EF189-8C5A-460A-9E86-A2EE2CABCA7D}"/>
+                </a:ext>
+              </a:extLst>
+            </p:cNvPr>
+            <p:cNvSpPr/>
+            <p:nvPr/>
+          </p:nvSpPr>
+          <p:spPr>
+            <a:xfrm rot="15605945">
+              <a:off x="8669166" y="703560"/>
+              <a:ext cx="334126" cy="256660"/>
+            </a:xfrm>
+            <a:prstGeom prst="can">
+              <a:avLst>
+                <a:gd name="adj" fmla="val 50000"/>
+              </a:avLst>
+            </a:prstGeom>
+            <a:ln w="28575"/>
+          </p:spPr>
+          <p:style>
+            <a:lnRef idx="2">
+              <a:schemeClr val="dk1">
+                <a:shade val="50000"/>
+              </a:schemeClr>
+            </a:lnRef>
+            <a:fillRef idx="1">
+              <a:schemeClr val="dk1"/>
+            </a:fillRef>
+            <a:effectRef idx="0">
+              <a:schemeClr val="dk1"/>
+            </a:effectRef>
+            <a:fontRef idx="minor">
+              <a:schemeClr val="lt1"/>
+            </a:fontRef>
+          </p:style>
+          <p:txBody>
+            <a:bodyPr rtlCol="0" anchor="ctr"/>
+            <a:lstStyle/>
+            <a:p>
+              <a:pPr algn="ctr"/>
+              <a:endParaRPr lang="en-US"/>
+            </a:p>
+          </p:txBody>
+        </p:sp>
+        <p:sp>
+          <p:nvSpPr>
+            <p:cNvPr id="64" name="Cylinder 63">
+              <a:extLst>
+                <a:ext uri="{FF2B5EF4-FFF2-40B4-BE49-F238E27FC236}">
+                  <a16:creationId xmlns:a16="http://schemas.microsoft.com/office/drawing/2014/main" id="{33FC726D-4C1E-4D2C-86A6-3C272391D98B}"/>
+                </a:ext>
+              </a:extLst>
+            </p:cNvPr>
+            <p:cNvSpPr/>
+            <p:nvPr/>
+          </p:nvSpPr>
+          <p:spPr>
+            <a:xfrm rot="15605945">
+              <a:off x="8877040" y="716220"/>
+              <a:ext cx="372558" cy="286182"/>
+            </a:xfrm>
+            <a:prstGeom prst="can">
+              <a:avLst>
+                <a:gd name="adj" fmla="val 50000"/>
+              </a:avLst>
+            </a:prstGeom>
+            <a:ln w="28575"/>
+          </p:spPr>
+          <p:style>
+            <a:lnRef idx="2">
+              <a:schemeClr val="dk1">
+                <a:shade val="50000"/>
+              </a:schemeClr>
+            </a:lnRef>
+            <a:fillRef idx="1">
+              <a:schemeClr val="dk1"/>
+            </a:fillRef>
+            <a:effectRef idx="0">
+              <a:schemeClr val="dk1"/>
+            </a:effectRef>
+            <a:fontRef idx="minor">
+              <a:schemeClr val="lt1"/>
+            </a:fontRef>
+          </p:style>
+          <p:txBody>
+            <a:bodyPr rtlCol="0" anchor="ctr"/>
+            <a:lstStyle/>
+            <a:p>
+              <a:pPr algn="ctr"/>
+              <a:endParaRPr lang="en-US"/>
+            </a:p>
+          </p:txBody>
+        </p:sp>
+      </p:grpSp>
+      <p:grpSp>
+        <p:nvGrpSpPr>
+          <p:cNvPr id="67" name="Group 66">
+            <a:extLst>
+              <a:ext uri="{FF2B5EF4-FFF2-40B4-BE49-F238E27FC236}">
+                <a16:creationId xmlns:a16="http://schemas.microsoft.com/office/drawing/2014/main" id="{E8A00947-6465-4C60-87F8-A33AD7B11AA7}"/>
+              </a:ext>
+            </a:extLst>
+          </p:cNvPr>
+          <p:cNvGrpSpPr/>
+          <p:nvPr/>
+        </p:nvGrpSpPr>
+        <p:grpSpPr>
+          <a:xfrm>
+            <a:off x="9393214" y="2126612"/>
+            <a:ext cx="1238949" cy="447746"/>
+            <a:chOff x="8707899" y="597844"/>
+            <a:chExt cx="1238949" cy="447746"/>
+          </a:xfrm>
+        </p:grpSpPr>
+        <p:sp>
+          <p:nvSpPr>
+            <p:cNvPr id="69" name="Arrow: Curved Right 68">
+              <a:extLst>
+                <a:ext uri="{FF2B5EF4-FFF2-40B4-BE49-F238E27FC236}">
+                  <a16:creationId xmlns:a16="http://schemas.microsoft.com/office/drawing/2014/main" id="{A4F0AA07-B69A-49F3-99A4-6F7592055911}"/>
+                </a:ext>
+              </a:extLst>
+            </p:cNvPr>
+            <p:cNvSpPr/>
+            <p:nvPr/>
+          </p:nvSpPr>
+          <p:spPr>
+            <a:xfrm rot="20865349" flipH="1">
+              <a:off x="8945041" y="597844"/>
+              <a:ext cx="1001807" cy="313286"/>
+            </a:xfrm>
+            <a:prstGeom prst="curvedRightArrow">
+              <a:avLst>
+                <a:gd name="adj1" fmla="val 40132"/>
+                <a:gd name="adj2" fmla="val 27281"/>
+                <a:gd name="adj3" fmla="val 47456"/>
+              </a:avLst>
+            </a:prstGeom>
+          </p:spPr>
+          <p:style>
+            <a:lnRef idx="2">
+              <a:schemeClr val="dk1">
+                <a:shade val="50000"/>
+              </a:schemeClr>
+            </a:lnRef>
+            <a:fillRef idx="1">
+              <a:schemeClr val="dk1"/>
+            </a:fillRef>
+            <a:effectRef idx="0">
+              <a:schemeClr val="dk1"/>
+            </a:effectRef>
+            <a:fontRef idx="minor">
+              <a:schemeClr val="lt1"/>
+            </a:fontRef>
+          </p:style>
+          <p:txBody>
+            <a:bodyPr rtlCol="0" anchor="ctr"/>
+            <a:lstStyle/>
+            <a:p>
+              <a:pPr algn="ctr"/>
+              <a:endParaRPr lang="en-US">
+                <a:solidFill>
+                  <a:schemeClr val="tx1"/>
+                </a:solidFill>
+              </a:endParaRPr>
+            </a:p>
+          </p:txBody>
+        </p:sp>
+        <p:sp>
+          <p:nvSpPr>
+            <p:cNvPr id="70" name="Cylinder 69">
+              <a:extLst>
+                <a:ext uri="{FF2B5EF4-FFF2-40B4-BE49-F238E27FC236}">
+                  <a16:creationId xmlns:a16="http://schemas.microsoft.com/office/drawing/2014/main" id="{B2B39281-E2EE-4F09-AFF3-ED2933D9C560}"/>
+                </a:ext>
+              </a:extLst>
+            </p:cNvPr>
+            <p:cNvSpPr/>
+            <p:nvPr/>
+          </p:nvSpPr>
+          <p:spPr>
+            <a:xfrm rot="15605945">
+              <a:off x="8669166" y="703560"/>
+              <a:ext cx="334126" cy="256660"/>
+            </a:xfrm>
+            <a:prstGeom prst="can">
+              <a:avLst>
+                <a:gd name="adj" fmla="val 50000"/>
+              </a:avLst>
+            </a:prstGeom>
+            <a:ln w="28575"/>
+          </p:spPr>
+          <p:style>
+            <a:lnRef idx="2">
+              <a:schemeClr val="dk1">
+                <a:shade val="50000"/>
+              </a:schemeClr>
+            </a:lnRef>
+            <a:fillRef idx="1">
+              <a:schemeClr val="dk1"/>
+            </a:fillRef>
+            <a:effectRef idx="0">
+              <a:schemeClr val="dk1"/>
+            </a:effectRef>
+            <a:fontRef idx="minor">
+              <a:schemeClr val="lt1"/>
+            </a:fontRef>
+          </p:style>
+          <p:txBody>
+            <a:bodyPr rtlCol="0" anchor="ctr"/>
+            <a:lstStyle/>
+            <a:p>
+              <a:pPr algn="ctr"/>
+              <a:endParaRPr lang="en-US"/>
+            </a:p>
+          </p:txBody>
+        </p:sp>
+        <p:sp>
+          <p:nvSpPr>
+            <p:cNvPr id="71" name="Cylinder 70">
+              <a:extLst>
+                <a:ext uri="{FF2B5EF4-FFF2-40B4-BE49-F238E27FC236}">
+                  <a16:creationId xmlns:a16="http://schemas.microsoft.com/office/drawing/2014/main" id="{96750C45-6F64-4DA7-A8E4-EFC3CE27CB4D}"/>
+                </a:ext>
+              </a:extLst>
+            </p:cNvPr>
+            <p:cNvSpPr/>
+            <p:nvPr/>
+          </p:nvSpPr>
+          <p:spPr>
+            <a:xfrm rot="15605945">
+              <a:off x="8877040" y="716220"/>
+              <a:ext cx="372558" cy="286182"/>
+            </a:xfrm>
+            <a:prstGeom prst="can">
+              <a:avLst>
+                <a:gd name="adj" fmla="val 50000"/>
+              </a:avLst>
+            </a:prstGeom>
+            <a:ln w="28575"/>
+          </p:spPr>
+          <p:style>
+            <a:lnRef idx="2">
+              <a:schemeClr val="dk1">
+                <a:shade val="50000"/>
+              </a:schemeClr>
+            </a:lnRef>
+            <a:fillRef idx="1">
+              <a:schemeClr val="dk1"/>
+            </a:fillRef>
+            <a:effectRef idx="0">
+              <a:schemeClr val="dk1"/>
+            </a:effectRef>
+            <a:fontRef idx="minor">
+              <a:schemeClr val="lt1"/>
+            </a:fontRef>
+          </p:style>
+          <p:txBody>
+            <a:bodyPr rtlCol="0" anchor="ctr"/>
+            <a:lstStyle/>
+            <a:p>
+              <a:pPr algn="ctr"/>
+              <a:endParaRPr lang="en-US"/>
+            </a:p>
+          </p:txBody>
+        </p:sp>
+      </p:grpSp>
     </p:spTree>
     <p:extLst>
       <p:ext uri="{BB962C8B-B14F-4D97-AF65-F5344CB8AC3E}">

</xml_diff>